<commit_message>
Correções e continuação do projeto
</commit_message>
<xml_diff>
--- a/16 - DFD Essencial para cada Capacidade.pptx
+++ b/16 - DFD Essencial para cada Capacidade.pptx
@@ -6,6 +6,7 @@
   </p:sldMasterIdLst>
   <p:sldIdLst>
     <p:sldId id="265" r:id="rId2"/>
+    <p:sldId id="266" r:id="rId3"/>
   </p:sldIdLst>
   <p:sldSz cx="12192000" cy="6858000"/>
   <p:notesSz cx="6858000" cy="9144000"/>
@@ -243,7 +244,7 @@
           <a:p>
             <a:fld id="{D8F44359-8032-4F84-8C51-844047DAC487}" type="datetimeFigureOut">
               <a:rPr lang="pt-BR" smtClean="0"/>
-              <a:t>18/09/2020</a:t>
+              <a:t>09/10/2020</a:t>
             </a:fld>
             <a:endParaRPr lang="pt-BR"/>
           </a:p>
@@ -413,7 +414,7 @@
           <a:p>
             <a:fld id="{D8F44359-8032-4F84-8C51-844047DAC487}" type="datetimeFigureOut">
               <a:rPr lang="pt-BR" smtClean="0"/>
-              <a:t>18/09/2020</a:t>
+              <a:t>09/10/2020</a:t>
             </a:fld>
             <a:endParaRPr lang="pt-BR"/>
           </a:p>
@@ -593,7 +594,7 @@
           <a:p>
             <a:fld id="{D8F44359-8032-4F84-8C51-844047DAC487}" type="datetimeFigureOut">
               <a:rPr lang="pt-BR" smtClean="0"/>
-              <a:t>18/09/2020</a:t>
+              <a:t>09/10/2020</a:t>
             </a:fld>
             <a:endParaRPr lang="pt-BR"/>
           </a:p>
@@ -763,7 +764,7 @@
           <a:p>
             <a:fld id="{D8F44359-8032-4F84-8C51-844047DAC487}" type="datetimeFigureOut">
               <a:rPr lang="pt-BR" smtClean="0"/>
-              <a:t>18/09/2020</a:t>
+              <a:t>09/10/2020</a:t>
             </a:fld>
             <a:endParaRPr lang="pt-BR"/>
           </a:p>
@@ -1009,7 +1010,7 @@
           <a:p>
             <a:fld id="{D8F44359-8032-4F84-8C51-844047DAC487}" type="datetimeFigureOut">
               <a:rPr lang="pt-BR" smtClean="0"/>
-              <a:t>18/09/2020</a:t>
+              <a:t>09/10/2020</a:t>
             </a:fld>
             <a:endParaRPr lang="pt-BR"/>
           </a:p>
@@ -1241,7 +1242,7 @@
           <a:p>
             <a:fld id="{D8F44359-8032-4F84-8C51-844047DAC487}" type="datetimeFigureOut">
               <a:rPr lang="pt-BR" smtClean="0"/>
-              <a:t>18/09/2020</a:t>
+              <a:t>09/10/2020</a:t>
             </a:fld>
             <a:endParaRPr lang="pt-BR"/>
           </a:p>
@@ -1608,7 +1609,7 @@
           <a:p>
             <a:fld id="{D8F44359-8032-4F84-8C51-844047DAC487}" type="datetimeFigureOut">
               <a:rPr lang="pt-BR" smtClean="0"/>
-              <a:t>18/09/2020</a:t>
+              <a:t>09/10/2020</a:t>
             </a:fld>
             <a:endParaRPr lang="pt-BR"/>
           </a:p>
@@ -1726,7 +1727,7 @@
           <a:p>
             <a:fld id="{D8F44359-8032-4F84-8C51-844047DAC487}" type="datetimeFigureOut">
               <a:rPr lang="pt-BR" smtClean="0"/>
-              <a:t>18/09/2020</a:t>
+              <a:t>09/10/2020</a:t>
             </a:fld>
             <a:endParaRPr lang="pt-BR"/>
           </a:p>
@@ -1821,7 +1822,7 @@
           <a:p>
             <a:fld id="{D8F44359-8032-4F84-8C51-844047DAC487}" type="datetimeFigureOut">
               <a:rPr lang="pt-BR" smtClean="0"/>
-              <a:t>18/09/2020</a:t>
+              <a:t>09/10/2020</a:t>
             </a:fld>
             <a:endParaRPr lang="pt-BR"/>
           </a:p>
@@ -2098,7 +2099,7 @@
           <a:p>
             <a:fld id="{D8F44359-8032-4F84-8C51-844047DAC487}" type="datetimeFigureOut">
               <a:rPr lang="pt-BR" smtClean="0"/>
-              <a:t>18/09/2020</a:t>
+              <a:t>09/10/2020</a:t>
             </a:fld>
             <a:endParaRPr lang="pt-BR"/>
           </a:p>
@@ -2351,7 +2352,7 @@
           <a:p>
             <a:fld id="{D8F44359-8032-4F84-8C51-844047DAC487}" type="datetimeFigureOut">
               <a:rPr lang="pt-BR" smtClean="0"/>
-              <a:t>18/09/2020</a:t>
+              <a:t>09/10/2020</a:t>
             </a:fld>
             <a:endParaRPr lang="pt-BR"/>
           </a:p>
@@ -2564,7 +2565,7 @@
           <a:p>
             <a:fld id="{D8F44359-8032-4F84-8C51-844047DAC487}" type="datetimeFigureOut">
               <a:rPr lang="pt-BR" smtClean="0"/>
-              <a:t>18/09/2020</a:t>
+              <a:t>09/10/2020</a:t>
             </a:fld>
             <a:endParaRPr lang="pt-BR"/>
           </a:p>
@@ -3009,7 +3010,7 @@
           </a:lstStyle>
           <a:p>
             <a:r>
-              <a:rPr lang="pt-BR" smtClean="0"/>
+              <a:rPr lang="pt-BR" dirty="0" smtClean="0"/>
               <a:t>Capacidade: Tratar a compra do produto</a:t>
             </a:r>
             <a:endParaRPr lang="pt-BR" dirty="0"/>
@@ -3909,7 +3910,7 @@
         </p:nvSpPr>
         <p:spPr>
           <a:xfrm>
-            <a:off x="2813141" y="2093947"/>
+            <a:off x="2908391" y="2093947"/>
             <a:ext cx="1339122" cy="461665"/>
           </a:xfrm>
           <a:prstGeom prst="rect">
@@ -4339,8 +4340,8 @@
         </p:nvSpPr>
         <p:spPr>
           <a:xfrm>
-            <a:off x="5627611" y="4464406"/>
-            <a:ext cx="649816" cy="276999"/>
+            <a:off x="5408536" y="4464406"/>
+            <a:ext cx="1076208" cy="276999"/>
           </a:xfrm>
           <a:prstGeom prst="rect">
             <a:avLst/>
@@ -4360,7 +4361,7 @@
                 <a:latin typeface="Arial" panose="020B0604020202020204" pitchFamily="34" charset="0"/>
                 <a:cs typeface="Arial" panose="020B0604020202020204" pitchFamily="34" charset="0"/>
               </a:rPr>
-              <a:t>Caixa</a:t>
+              <a:t>Lançamento</a:t>
             </a:r>
           </a:p>
         </p:txBody>
@@ -4472,7 +4473,7 @@
                 <a:latin typeface="Arial" panose="020B0604020202020204" pitchFamily="34" charset="0"/>
                 <a:cs typeface="Arial" panose="020B0604020202020204" pitchFamily="34" charset="0"/>
               </a:rPr>
-              <a:t>Nota + produto + (troco)</a:t>
+              <a:t>Nota + produtos + (troco)</a:t>
             </a:r>
           </a:p>
         </p:txBody>
@@ -4692,15 +4693,13 @@
         </p:nvSpPr>
         <p:spPr>
           <a:xfrm>
-            <a:off x="7284462" y="2621416"/>
-            <a:ext cx="2231783" cy="276999"/>
+            <a:off x="7716149" y="2419260"/>
+            <a:ext cx="968982" cy="646331"/>
           </a:xfrm>
           <a:prstGeom prst="rect">
             <a:avLst/>
           </a:prstGeom>
-          <a:solidFill>
-            <a:schemeClr val="bg1"/>
-          </a:solidFill>
+          <a:noFill/>
         </p:spPr>
         <p:txBody>
           <a:bodyPr wrap="square" rtlCol="0">
@@ -4715,6 +4714,8 @@
               </a:rPr>
               <a:t>Pagamento em </a:t>
             </a:r>
+          </a:p>
+          <a:p>
             <a:r>
               <a:rPr lang="pt-BR" sz="1200" dirty="0" smtClean="0">
                 <a:latin typeface="Arial" panose="020B0604020202020204" pitchFamily="34" charset="0"/>
@@ -4804,19 +4805,8 @@
                 <a:latin typeface="Arial" panose="020B0604020202020204" pitchFamily="34" charset="0"/>
                 <a:cs typeface="Arial" panose="020B0604020202020204" pitchFamily="34" charset="0"/>
               </a:rPr>
-              <a:t>em </a:t>
-            </a:r>
-            <a:r>
-              <a:rPr lang="pt-BR" sz="1000" dirty="0" smtClean="0">
-                <a:latin typeface="Arial" panose="020B0604020202020204" pitchFamily="34" charset="0"/>
-                <a:cs typeface="Arial" panose="020B0604020202020204" pitchFamily="34" charset="0"/>
-              </a:rPr>
-              <a:t>cartão</a:t>
-            </a:r>
-            <a:endParaRPr lang="pt-BR" sz="1000" dirty="0" smtClean="0">
-              <a:latin typeface="Arial" panose="020B0604020202020204" pitchFamily="34" charset="0"/>
-              <a:cs typeface="Arial" panose="020B0604020202020204" pitchFamily="34" charset="0"/>
-            </a:endParaRPr>
+              <a:t>em cartão</a:t>
+            </a:r>
           </a:p>
         </p:txBody>
       </p:sp>
@@ -4908,15 +4898,13 @@
         </p:nvSpPr>
         <p:spPr>
           <a:xfrm>
-            <a:off x="8982901" y="3032145"/>
+            <a:off x="8878141" y="2830408"/>
             <a:ext cx="1339122" cy="276999"/>
           </a:xfrm>
           <a:prstGeom prst="rect">
             <a:avLst/>
           </a:prstGeom>
-          <a:solidFill>
-            <a:schemeClr val="bg1"/>
-          </a:solidFill>
+          <a:noFill/>
         </p:spPr>
         <p:txBody>
           <a:bodyPr wrap="square" rtlCol="0">
@@ -4929,19 +4917,8 @@
                 <a:latin typeface="Arial" panose="020B0604020202020204" pitchFamily="34" charset="0"/>
                 <a:cs typeface="Arial" panose="020B0604020202020204" pitchFamily="34" charset="0"/>
               </a:rPr>
-              <a:t>Nota + </a:t>
-            </a:r>
-            <a:r>
-              <a:rPr lang="pt-BR" sz="1200" dirty="0" smtClean="0">
-                <a:latin typeface="Arial" panose="020B0604020202020204" pitchFamily="34" charset="0"/>
-                <a:cs typeface="Arial" panose="020B0604020202020204" pitchFamily="34" charset="0"/>
-              </a:rPr>
-              <a:t>produto</a:t>
-            </a:r>
-            <a:endParaRPr lang="pt-BR" sz="1200" dirty="0" smtClean="0">
-              <a:latin typeface="Arial" panose="020B0604020202020204" pitchFamily="34" charset="0"/>
-              <a:cs typeface="Arial" panose="020B0604020202020204" pitchFamily="34" charset="0"/>
-            </a:endParaRPr>
+              <a:t>Nota + produto</a:t>
+            </a:r>
           </a:p>
         </p:txBody>
       </p:sp>
@@ -5019,10 +4996,1619 @@
           </a:fontRef>
         </p:style>
       </p:cxnSp>
+      <p:cxnSp>
+        <p:nvCxnSpPr>
+          <p:cNvPr id="55" name="Conector em curva 54"/>
+          <p:cNvCxnSpPr/>
+          <p:nvPr/>
+        </p:nvCxnSpPr>
+        <p:spPr>
+          <a:xfrm rot="10800000">
+            <a:off x="5390968" y="1975447"/>
+            <a:ext cx="54375" cy="1580220"/>
+          </a:xfrm>
+          <a:prstGeom prst="curvedConnector3">
+            <a:avLst>
+              <a:gd name="adj1" fmla="val 1623139"/>
+            </a:avLst>
+          </a:prstGeom>
+          <a:ln>
+            <a:solidFill>
+              <a:schemeClr val="tx1"/>
+            </a:solidFill>
+            <a:tailEnd type="triangle"/>
+          </a:ln>
+        </p:spPr>
+        <p:style>
+          <a:lnRef idx="1">
+            <a:schemeClr val="accent1"/>
+          </a:lnRef>
+          <a:fillRef idx="0">
+            <a:schemeClr val="accent1"/>
+          </a:fillRef>
+          <a:effectRef idx="0">
+            <a:schemeClr val="accent1"/>
+          </a:effectRef>
+          <a:fontRef idx="minor">
+            <a:schemeClr val="tx1"/>
+          </a:fontRef>
+        </p:style>
+      </p:cxnSp>
+      <p:sp>
+        <p:nvSpPr>
+          <p:cNvPr id="56" name="CaixaDeTexto 55"/>
+          <p:cNvSpPr txBox="1"/>
+          <p:nvPr/>
+        </p:nvSpPr>
+        <p:spPr>
+          <a:xfrm>
+            <a:off x="4205029" y="2909354"/>
+            <a:ext cx="1212743" cy="461665"/>
+          </a:xfrm>
+          <a:prstGeom prst="rect">
+            <a:avLst/>
+          </a:prstGeom>
+          <a:solidFill>
+            <a:schemeClr val="bg1"/>
+          </a:solidFill>
+        </p:spPr>
+        <p:txBody>
+          <a:bodyPr wrap="square" rtlCol="0">
+            <a:spAutoFit/>
+          </a:bodyPr>
+          <a:lstStyle/>
+          <a:p>
+            <a:r>
+              <a:rPr lang="pt-BR" sz="1200" dirty="0" smtClean="0">
+                <a:latin typeface="Arial" panose="020B0604020202020204" pitchFamily="34" charset="0"/>
+                <a:cs typeface="Arial" panose="020B0604020202020204" pitchFamily="34" charset="0"/>
+              </a:rPr>
+              <a:t>Pagamento </a:t>
+            </a:r>
+          </a:p>
+          <a:p>
+            <a:r>
+              <a:rPr lang="pt-BR" sz="1200" dirty="0" smtClean="0">
+                <a:latin typeface="Arial" panose="020B0604020202020204" pitchFamily="34" charset="0"/>
+                <a:cs typeface="Arial" panose="020B0604020202020204" pitchFamily="34" charset="0"/>
+              </a:rPr>
+              <a:t>em dinheiro</a:t>
+            </a:r>
+          </a:p>
+        </p:txBody>
+      </p:sp>
+      <p:sp>
+        <p:nvSpPr>
+          <p:cNvPr id="57" name="Retângulo 56"/>
+          <p:cNvSpPr/>
+          <p:nvPr/>
+        </p:nvSpPr>
+        <p:spPr>
+          <a:xfrm>
+            <a:off x="9971572" y="1746991"/>
+            <a:ext cx="929390" cy="599607"/>
+          </a:xfrm>
+          <a:prstGeom prst="rect">
+            <a:avLst/>
+          </a:prstGeom>
+          <a:noFill/>
+          <a:ln>
+            <a:solidFill>
+              <a:schemeClr val="tx1"/>
+            </a:solidFill>
+          </a:ln>
+        </p:spPr>
+        <p:style>
+          <a:lnRef idx="2">
+            <a:schemeClr val="accent1">
+              <a:shade val="50000"/>
+            </a:schemeClr>
+          </a:lnRef>
+          <a:fillRef idx="1">
+            <a:schemeClr val="accent1"/>
+          </a:fillRef>
+          <a:effectRef idx="0">
+            <a:schemeClr val="accent1"/>
+          </a:effectRef>
+          <a:fontRef idx="minor">
+            <a:schemeClr val="lt1"/>
+          </a:fontRef>
+        </p:style>
+        <p:txBody>
+          <a:bodyPr rtlCol="0" anchor="ctr"/>
+          <a:lstStyle/>
+          <a:p>
+            <a:pPr algn="ctr"/>
+            <a:endParaRPr lang="pt-BR"/>
+          </a:p>
+        </p:txBody>
+      </p:sp>
+      <p:sp>
+        <p:nvSpPr>
+          <p:cNvPr id="58" name="CaixaDeTexto 57"/>
+          <p:cNvSpPr txBox="1"/>
+          <p:nvPr/>
+        </p:nvSpPr>
+        <p:spPr>
+          <a:xfrm>
+            <a:off x="9993818" y="1812827"/>
+            <a:ext cx="884897" cy="461665"/>
+          </a:xfrm>
+          <a:prstGeom prst="rect">
+            <a:avLst/>
+          </a:prstGeom>
+          <a:solidFill>
+            <a:schemeClr val="bg1"/>
+          </a:solidFill>
+        </p:spPr>
+        <p:txBody>
+          <a:bodyPr wrap="square" rtlCol="0">
+            <a:spAutoFit/>
+          </a:bodyPr>
+          <a:lstStyle/>
+          <a:p>
+            <a:r>
+              <a:rPr lang="pt-BR" sz="1200" dirty="0" smtClean="0">
+                <a:latin typeface="Arial" panose="020B0604020202020204" pitchFamily="34" charset="0"/>
+                <a:cs typeface="Arial" panose="020B0604020202020204" pitchFamily="34" charset="0"/>
+              </a:rPr>
+              <a:t>Provedor do cartão</a:t>
+            </a:r>
+          </a:p>
+        </p:txBody>
+      </p:sp>
+      <p:cxnSp>
+        <p:nvCxnSpPr>
+          <p:cNvPr id="13" name="Conector em curva 12"/>
+          <p:cNvCxnSpPr>
+            <a:stCxn id="49" idx="0"/>
+          </p:cNvCxnSpPr>
+          <p:nvPr/>
+        </p:nvCxnSpPr>
+        <p:spPr>
+          <a:xfrm rot="5400000" flipH="1" flipV="1">
+            <a:off x="8703813" y="2090352"/>
+            <a:ext cx="1192027" cy="1343491"/>
+          </a:xfrm>
+          <a:prstGeom prst="curvedConnector2">
+            <a:avLst/>
+          </a:prstGeom>
+          <a:ln>
+            <a:solidFill>
+              <a:schemeClr val="tx1"/>
+            </a:solidFill>
+            <a:headEnd type="triangle"/>
+            <a:tailEnd type="triangle"/>
+          </a:ln>
+        </p:spPr>
+        <p:style>
+          <a:lnRef idx="1">
+            <a:schemeClr val="accent1"/>
+          </a:lnRef>
+          <a:fillRef idx="0">
+            <a:schemeClr val="accent1"/>
+          </a:fillRef>
+          <a:effectRef idx="0">
+            <a:schemeClr val="accent1"/>
+          </a:effectRef>
+          <a:fontRef idx="minor">
+            <a:schemeClr val="tx1"/>
+          </a:fontRef>
+        </p:style>
+      </p:cxnSp>
+      <p:sp>
+        <p:nvSpPr>
+          <p:cNvPr id="70" name="CaixaDeTexto 69"/>
+          <p:cNvSpPr txBox="1"/>
+          <p:nvPr/>
+        </p:nvSpPr>
+        <p:spPr>
+          <a:xfrm>
+            <a:off x="8940464" y="1745996"/>
+            <a:ext cx="1125264" cy="461665"/>
+          </a:xfrm>
+          <a:prstGeom prst="rect">
+            <a:avLst/>
+          </a:prstGeom>
+          <a:noFill/>
+        </p:spPr>
+        <p:txBody>
+          <a:bodyPr wrap="square" rtlCol="0">
+            <a:spAutoFit/>
+          </a:bodyPr>
+          <a:lstStyle/>
+          <a:p>
+            <a:r>
+              <a:rPr lang="pt-BR" sz="1200" dirty="0" smtClean="0">
+                <a:latin typeface="Arial" panose="020B0604020202020204" pitchFamily="34" charset="0"/>
+                <a:cs typeface="Arial" panose="020B0604020202020204" pitchFamily="34" charset="0"/>
+              </a:rPr>
+              <a:t>Verifica o tipo do cartão</a:t>
+            </a:r>
+          </a:p>
+        </p:txBody>
+      </p:sp>
     </p:spTree>
     <p:extLst>
       <p:ext uri="{BB962C8B-B14F-4D97-AF65-F5344CB8AC3E}">
         <p14:creationId xmlns:p14="http://schemas.microsoft.com/office/powerpoint/2010/main" val="1067195003"/>
+      </p:ext>
+    </p:extLst>
+  </p:cSld>
+  <p:clrMapOvr>
+    <a:masterClrMapping/>
+  </p:clrMapOvr>
+</p:sld>
+</file>
+
+<file path=ppt/slides/slide2.xml><?xml version="1.0" encoding="utf-8"?>
+<p:sld xmlns:a="http://schemas.openxmlformats.org/drawingml/2006/main" xmlns:r="http://schemas.openxmlformats.org/officeDocument/2006/relationships" xmlns:p="http://schemas.openxmlformats.org/presentationml/2006/main">
+  <p:cSld>
+    <p:spTree>
+      <p:nvGrpSpPr>
+        <p:cNvPr id="1" name=""/>
+        <p:cNvGrpSpPr/>
+        <p:nvPr/>
+      </p:nvGrpSpPr>
+      <p:grpSpPr>
+        <a:xfrm>
+          <a:off x="0" y="0"/>
+          <a:ext cx="0" cy="0"/>
+          <a:chOff x="0" y="0"/>
+          <a:chExt cx="0" cy="0"/>
+        </a:xfrm>
+      </p:grpSpPr>
+      <p:sp>
+        <p:nvSpPr>
+          <p:cNvPr id="2" name="Título 1"/>
+          <p:cNvSpPr txBox="1">
+            <a:spLocks/>
+          </p:cNvSpPr>
+          <p:nvPr/>
+        </p:nvSpPr>
+        <p:spPr>
+          <a:xfrm>
+            <a:off x="29982" y="63740"/>
+            <a:ext cx="10515600" cy="730740"/>
+          </a:xfrm>
+          <a:prstGeom prst="rect">
+            <a:avLst/>
+          </a:prstGeom>
+        </p:spPr>
+        <p:txBody>
+          <a:bodyPr/>
+          <a:lstStyle>
+            <a:lvl1pPr algn="l" defTabSz="914400" rtl="0" eaLnBrk="1" latinLnBrk="0" hangingPunct="1">
+              <a:lnSpc>
+                <a:spcPct val="90000"/>
+              </a:lnSpc>
+              <a:spcBef>
+                <a:spcPct val="0"/>
+              </a:spcBef>
+              <a:buNone/>
+              <a:defRPr sz="4400" kern="1200">
+                <a:solidFill>
+                  <a:schemeClr val="tx1"/>
+                </a:solidFill>
+                <a:latin typeface="+mj-lt"/>
+                <a:ea typeface="+mj-ea"/>
+                <a:cs typeface="+mj-cs"/>
+              </a:defRPr>
+            </a:lvl1pPr>
+          </a:lstStyle>
+          <a:p>
+            <a:r>
+              <a:rPr lang="pt-BR" dirty="0" smtClean="0"/>
+              <a:t>Capacidade: Tratar a troca do produto</a:t>
+            </a:r>
+            <a:endParaRPr lang="pt-BR" dirty="0"/>
+          </a:p>
+        </p:txBody>
+      </p:sp>
+      <p:sp>
+        <p:nvSpPr>
+          <p:cNvPr id="3" name="Retângulo 2"/>
+          <p:cNvSpPr/>
+          <p:nvPr/>
+        </p:nvSpPr>
+        <p:spPr>
+          <a:xfrm>
+            <a:off x="4083026" y="1781927"/>
+            <a:ext cx="929390" cy="599607"/>
+          </a:xfrm>
+          <a:prstGeom prst="rect">
+            <a:avLst/>
+          </a:prstGeom>
+          <a:noFill/>
+          <a:ln>
+            <a:solidFill>
+              <a:schemeClr val="tx1"/>
+            </a:solidFill>
+          </a:ln>
+        </p:spPr>
+        <p:style>
+          <a:lnRef idx="2">
+            <a:schemeClr val="accent1">
+              <a:shade val="50000"/>
+            </a:schemeClr>
+          </a:lnRef>
+          <a:fillRef idx="1">
+            <a:schemeClr val="accent1"/>
+          </a:fillRef>
+          <a:effectRef idx="0">
+            <a:schemeClr val="accent1"/>
+          </a:effectRef>
+          <a:fontRef idx="minor">
+            <a:schemeClr val="lt1"/>
+          </a:fontRef>
+        </p:style>
+        <p:txBody>
+          <a:bodyPr rtlCol="0" anchor="ctr"/>
+          <a:lstStyle/>
+          <a:p>
+            <a:pPr algn="ctr"/>
+            <a:endParaRPr lang="pt-BR"/>
+          </a:p>
+        </p:txBody>
+      </p:sp>
+      <p:sp>
+        <p:nvSpPr>
+          <p:cNvPr id="4" name="CaixaDeTexto 3"/>
+          <p:cNvSpPr txBox="1"/>
+          <p:nvPr/>
+        </p:nvSpPr>
+        <p:spPr>
+          <a:xfrm>
+            <a:off x="4227932" y="1927154"/>
+            <a:ext cx="689548" cy="276999"/>
+          </a:xfrm>
+          <a:prstGeom prst="rect">
+            <a:avLst/>
+          </a:prstGeom>
+          <a:solidFill>
+            <a:schemeClr val="bg1"/>
+          </a:solidFill>
+        </p:spPr>
+        <p:txBody>
+          <a:bodyPr wrap="square" rtlCol="0">
+            <a:spAutoFit/>
+          </a:bodyPr>
+          <a:lstStyle/>
+          <a:p>
+            <a:r>
+              <a:rPr lang="pt-BR" sz="1200" dirty="0" smtClean="0">
+                <a:latin typeface="Arial" panose="020B0604020202020204" pitchFamily="34" charset="0"/>
+                <a:cs typeface="Arial" panose="020B0604020202020204" pitchFamily="34" charset="0"/>
+              </a:rPr>
+              <a:t>Cliente</a:t>
+            </a:r>
+          </a:p>
+        </p:txBody>
+      </p:sp>
+      <p:cxnSp>
+        <p:nvCxnSpPr>
+          <p:cNvPr id="5" name="Conector de seta reta 4"/>
+          <p:cNvCxnSpPr/>
+          <p:nvPr/>
+        </p:nvCxnSpPr>
+        <p:spPr>
+          <a:xfrm>
+            <a:off x="4547721" y="2381534"/>
+            <a:ext cx="6" cy="884417"/>
+          </a:xfrm>
+          <a:prstGeom prst="straightConnector1">
+            <a:avLst/>
+          </a:prstGeom>
+          <a:ln>
+            <a:solidFill>
+              <a:schemeClr val="tx1"/>
+            </a:solidFill>
+            <a:tailEnd type="triangle"/>
+          </a:ln>
+        </p:spPr>
+        <p:style>
+          <a:lnRef idx="1">
+            <a:schemeClr val="accent1"/>
+          </a:lnRef>
+          <a:fillRef idx="0">
+            <a:schemeClr val="accent1"/>
+          </a:fillRef>
+          <a:effectRef idx="0">
+            <a:schemeClr val="accent1"/>
+          </a:effectRef>
+          <a:fontRef idx="minor">
+            <a:schemeClr val="tx1"/>
+          </a:fontRef>
+        </p:style>
+      </p:cxnSp>
+      <p:sp>
+        <p:nvSpPr>
+          <p:cNvPr id="6" name="CaixaDeTexto 5"/>
+          <p:cNvSpPr txBox="1"/>
+          <p:nvPr/>
+        </p:nvSpPr>
+        <p:spPr>
+          <a:xfrm>
+            <a:off x="4225432" y="2632044"/>
+            <a:ext cx="689548" cy="461665"/>
+          </a:xfrm>
+          <a:prstGeom prst="rect">
+            <a:avLst/>
+          </a:prstGeom>
+          <a:solidFill>
+            <a:schemeClr val="bg1"/>
+          </a:solidFill>
+        </p:spPr>
+        <p:txBody>
+          <a:bodyPr wrap="square" rtlCol="0">
+            <a:spAutoFit/>
+          </a:bodyPr>
+          <a:lstStyle/>
+          <a:p>
+            <a:r>
+              <a:rPr lang="pt-BR" sz="1200" dirty="0" smtClean="0">
+                <a:latin typeface="Arial" panose="020B0604020202020204" pitchFamily="34" charset="0"/>
+                <a:cs typeface="Arial" panose="020B0604020202020204" pitchFamily="34" charset="0"/>
+              </a:rPr>
+              <a:t>Solicita troca</a:t>
+            </a:r>
+            <a:endParaRPr lang="pt-BR" sz="1200" dirty="0" smtClean="0">
+              <a:latin typeface="Arial" panose="020B0604020202020204" pitchFamily="34" charset="0"/>
+              <a:cs typeface="Arial" panose="020B0604020202020204" pitchFamily="34" charset="0"/>
+            </a:endParaRPr>
+          </a:p>
+        </p:txBody>
+      </p:sp>
+      <p:sp>
+        <p:nvSpPr>
+          <p:cNvPr id="7" name="Elipse 6"/>
+          <p:cNvSpPr/>
+          <p:nvPr/>
+        </p:nvSpPr>
+        <p:spPr>
+          <a:xfrm>
+            <a:off x="4195458" y="3265951"/>
+            <a:ext cx="704538" cy="644577"/>
+          </a:xfrm>
+          <a:prstGeom prst="ellipse">
+            <a:avLst/>
+          </a:prstGeom>
+          <a:noFill/>
+          <a:ln>
+            <a:solidFill>
+              <a:schemeClr val="tx1"/>
+            </a:solidFill>
+          </a:ln>
+        </p:spPr>
+        <p:style>
+          <a:lnRef idx="2">
+            <a:schemeClr val="accent1">
+              <a:shade val="50000"/>
+            </a:schemeClr>
+          </a:lnRef>
+          <a:fillRef idx="1">
+            <a:schemeClr val="accent1"/>
+          </a:fillRef>
+          <a:effectRef idx="0">
+            <a:schemeClr val="accent1"/>
+          </a:effectRef>
+          <a:fontRef idx="minor">
+            <a:schemeClr val="lt1"/>
+          </a:fontRef>
+        </p:style>
+        <p:txBody>
+          <a:bodyPr rtlCol="0" anchor="ctr"/>
+          <a:lstStyle/>
+          <a:p>
+            <a:pPr algn="ctr"/>
+            <a:endParaRPr lang="pt-BR"/>
+          </a:p>
+        </p:txBody>
+      </p:sp>
+      <p:cxnSp>
+        <p:nvCxnSpPr>
+          <p:cNvPr id="9" name="Conector reto 8"/>
+          <p:cNvCxnSpPr/>
+          <p:nvPr/>
+        </p:nvCxnSpPr>
+        <p:spPr>
+          <a:xfrm>
+            <a:off x="3993093" y="4465163"/>
+            <a:ext cx="1049303" cy="0"/>
+          </a:xfrm>
+          <a:prstGeom prst="line">
+            <a:avLst/>
+          </a:prstGeom>
+          <a:ln>
+            <a:solidFill>
+              <a:schemeClr val="tx1"/>
+            </a:solidFill>
+          </a:ln>
+        </p:spPr>
+        <p:style>
+          <a:lnRef idx="1">
+            <a:schemeClr val="accent1"/>
+          </a:lnRef>
+          <a:fillRef idx="0">
+            <a:schemeClr val="accent1"/>
+          </a:fillRef>
+          <a:effectRef idx="0">
+            <a:schemeClr val="accent1"/>
+          </a:effectRef>
+          <a:fontRef idx="minor">
+            <a:schemeClr val="tx1"/>
+          </a:fontRef>
+        </p:style>
+      </p:cxnSp>
+      <p:cxnSp>
+        <p:nvCxnSpPr>
+          <p:cNvPr id="10" name="Conector reto 9"/>
+          <p:cNvCxnSpPr/>
+          <p:nvPr/>
+        </p:nvCxnSpPr>
+        <p:spPr>
+          <a:xfrm>
+            <a:off x="3980603" y="4872393"/>
+            <a:ext cx="1049303" cy="0"/>
+          </a:xfrm>
+          <a:prstGeom prst="line">
+            <a:avLst/>
+          </a:prstGeom>
+          <a:ln>
+            <a:solidFill>
+              <a:schemeClr val="tx1"/>
+            </a:solidFill>
+          </a:ln>
+        </p:spPr>
+        <p:style>
+          <a:lnRef idx="1">
+            <a:schemeClr val="accent1"/>
+          </a:lnRef>
+          <a:fillRef idx="0">
+            <a:schemeClr val="accent1"/>
+          </a:fillRef>
+          <a:effectRef idx="0">
+            <a:schemeClr val="accent1"/>
+          </a:effectRef>
+          <a:fontRef idx="minor">
+            <a:schemeClr val="tx1"/>
+          </a:fontRef>
+        </p:style>
+      </p:cxnSp>
+      <p:sp>
+        <p:nvSpPr>
+          <p:cNvPr id="11" name="CaixaDeTexto 10"/>
+          <p:cNvSpPr txBox="1"/>
+          <p:nvPr/>
+        </p:nvSpPr>
+        <p:spPr>
+          <a:xfrm>
+            <a:off x="4137990" y="4505451"/>
+            <a:ext cx="836949" cy="276999"/>
+          </a:xfrm>
+          <a:prstGeom prst="rect">
+            <a:avLst/>
+          </a:prstGeom>
+          <a:solidFill>
+            <a:schemeClr val="bg1"/>
+          </a:solidFill>
+        </p:spPr>
+        <p:txBody>
+          <a:bodyPr wrap="square" rtlCol="0">
+            <a:spAutoFit/>
+          </a:bodyPr>
+          <a:lstStyle/>
+          <a:p>
+            <a:r>
+              <a:rPr lang="pt-BR" sz="1200" dirty="0" smtClean="0">
+                <a:latin typeface="Arial" panose="020B0604020202020204" pitchFamily="34" charset="0"/>
+                <a:cs typeface="Arial" panose="020B0604020202020204" pitchFamily="34" charset="0"/>
+              </a:rPr>
+              <a:t>Produto</a:t>
+            </a:r>
+          </a:p>
+        </p:txBody>
+      </p:sp>
+      <p:cxnSp>
+        <p:nvCxnSpPr>
+          <p:cNvPr id="15" name="Conector reto 14"/>
+          <p:cNvCxnSpPr/>
+          <p:nvPr/>
+        </p:nvCxnSpPr>
+        <p:spPr>
+          <a:xfrm>
+            <a:off x="5284744" y="4467662"/>
+            <a:ext cx="1049303" cy="0"/>
+          </a:xfrm>
+          <a:prstGeom prst="line">
+            <a:avLst/>
+          </a:prstGeom>
+          <a:ln>
+            <a:solidFill>
+              <a:schemeClr val="tx1"/>
+            </a:solidFill>
+          </a:ln>
+        </p:spPr>
+        <p:style>
+          <a:lnRef idx="1">
+            <a:schemeClr val="accent1"/>
+          </a:lnRef>
+          <a:fillRef idx="0">
+            <a:schemeClr val="accent1"/>
+          </a:fillRef>
+          <a:effectRef idx="0">
+            <a:schemeClr val="accent1"/>
+          </a:effectRef>
+          <a:fontRef idx="minor">
+            <a:schemeClr val="tx1"/>
+          </a:fontRef>
+        </p:style>
+      </p:cxnSp>
+      <p:cxnSp>
+        <p:nvCxnSpPr>
+          <p:cNvPr id="16" name="Conector reto 15"/>
+          <p:cNvCxnSpPr/>
+          <p:nvPr/>
+        </p:nvCxnSpPr>
+        <p:spPr>
+          <a:xfrm>
+            <a:off x="5272254" y="4874892"/>
+            <a:ext cx="1049303" cy="0"/>
+          </a:xfrm>
+          <a:prstGeom prst="line">
+            <a:avLst/>
+          </a:prstGeom>
+          <a:ln>
+            <a:solidFill>
+              <a:schemeClr val="tx1"/>
+            </a:solidFill>
+          </a:ln>
+        </p:spPr>
+        <p:style>
+          <a:lnRef idx="1">
+            <a:schemeClr val="accent1"/>
+          </a:lnRef>
+          <a:fillRef idx="0">
+            <a:schemeClr val="accent1"/>
+          </a:fillRef>
+          <a:effectRef idx="0">
+            <a:schemeClr val="accent1"/>
+          </a:effectRef>
+          <a:fontRef idx="minor">
+            <a:schemeClr val="tx1"/>
+          </a:fontRef>
+        </p:style>
+      </p:cxnSp>
+      <p:sp>
+        <p:nvSpPr>
+          <p:cNvPr id="17" name="CaixaDeTexto 16"/>
+          <p:cNvSpPr txBox="1"/>
+          <p:nvPr/>
+        </p:nvSpPr>
+        <p:spPr>
+          <a:xfrm>
+            <a:off x="5429641" y="4507950"/>
+            <a:ext cx="836949" cy="276999"/>
+          </a:xfrm>
+          <a:prstGeom prst="rect">
+            <a:avLst/>
+          </a:prstGeom>
+          <a:solidFill>
+            <a:schemeClr val="bg1"/>
+          </a:solidFill>
+        </p:spPr>
+        <p:txBody>
+          <a:bodyPr wrap="square" rtlCol="0">
+            <a:spAutoFit/>
+          </a:bodyPr>
+          <a:lstStyle/>
+          <a:p>
+            <a:r>
+              <a:rPr lang="pt-BR" sz="1200" dirty="0" smtClean="0">
+                <a:latin typeface="Arial" panose="020B0604020202020204" pitchFamily="34" charset="0"/>
+                <a:cs typeface="Arial" panose="020B0604020202020204" pitchFamily="34" charset="0"/>
+              </a:rPr>
+              <a:t>Pedido</a:t>
+            </a:r>
+          </a:p>
+        </p:txBody>
+      </p:sp>
+      <p:cxnSp>
+        <p:nvCxnSpPr>
+          <p:cNvPr id="20" name="Conector de seta reta 19"/>
+          <p:cNvCxnSpPr>
+            <a:stCxn id="7" idx="5"/>
+          </p:cNvCxnSpPr>
+          <p:nvPr/>
+        </p:nvCxnSpPr>
+        <p:spPr>
+          <a:xfrm>
+            <a:off x="4796819" y="3816132"/>
+            <a:ext cx="632822" cy="649031"/>
+          </a:xfrm>
+          <a:prstGeom prst="straightConnector1">
+            <a:avLst/>
+          </a:prstGeom>
+          <a:ln w="6350">
+            <a:solidFill>
+              <a:schemeClr val="tx1"/>
+            </a:solidFill>
+            <a:headEnd type="triangle"/>
+            <a:tailEnd type="triangle"/>
+          </a:ln>
+        </p:spPr>
+        <p:style>
+          <a:lnRef idx="1">
+            <a:schemeClr val="accent1"/>
+          </a:lnRef>
+          <a:fillRef idx="0">
+            <a:schemeClr val="accent1"/>
+          </a:fillRef>
+          <a:effectRef idx="0">
+            <a:schemeClr val="accent1"/>
+          </a:effectRef>
+          <a:fontRef idx="minor">
+            <a:schemeClr val="tx1"/>
+          </a:fontRef>
+        </p:style>
+      </p:cxnSp>
+      <p:cxnSp>
+        <p:nvCxnSpPr>
+          <p:cNvPr id="21" name="Conector de seta reta 20"/>
+          <p:cNvCxnSpPr/>
+          <p:nvPr/>
+        </p:nvCxnSpPr>
+        <p:spPr>
+          <a:xfrm flipV="1">
+            <a:off x="4547721" y="3910528"/>
+            <a:ext cx="6" cy="554635"/>
+          </a:xfrm>
+          <a:prstGeom prst="straightConnector1">
+            <a:avLst/>
+          </a:prstGeom>
+          <a:ln>
+            <a:solidFill>
+              <a:schemeClr val="tx1"/>
+            </a:solidFill>
+            <a:tailEnd type="triangle"/>
+          </a:ln>
+        </p:spPr>
+        <p:style>
+          <a:lnRef idx="1">
+            <a:schemeClr val="accent1"/>
+          </a:lnRef>
+          <a:fillRef idx="0">
+            <a:schemeClr val="accent1"/>
+          </a:fillRef>
+          <a:effectRef idx="0">
+            <a:schemeClr val="accent1"/>
+          </a:effectRef>
+          <a:fontRef idx="minor">
+            <a:schemeClr val="tx1"/>
+          </a:fontRef>
+        </p:style>
+      </p:cxnSp>
+      <p:cxnSp>
+        <p:nvCxnSpPr>
+          <p:cNvPr id="22" name="Conector em curva 21"/>
+          <p:cNvCxnSpPr/>
+          <p:nvPr/>
+        </p:nvCxnSpPr>
+        <p:spPr>
+          <a:xfrm flipV="1">
+            <a:off x="4899996" y="2081731"/>
+            <a:ext cx="112420" cy="1506509"/>
+          </a:xfrm>
+          <a:prstGeom prst="curvedConnector3">
+            <a:avLst>
+              <a:gd name="adj1" fmla="val 463353"/>
+            </a:avLst>
+          </a:prstGeom>
+          <a:ln>
+            <a:solidFill>
+              <a:schemeClr val="tx1"/>
+            </a:solidFill>
+            <a:tailEnd type="triangle"/>
+          </a:ln>
+        </p:spPr>
+        <p:style>
+          <a:lnRef idx="1">
+            <a:schemeClr val="accent1"/>
+          </a:lnRef>
+          <a:fillRef idx="0">
+            <a:schemeClr val="accent1"/>
+          </a:fillRef>
+          <a:effectRef idx="0">
+            <a:schemeClr val="accent1"/>
+          </a:effectRef>
+          <a:fontRef idx="minor">
+            <a:schemeClr val="tx1"/>
+          </a:fontRef>
+        </p:style>
+      </p:cxnSp>
+      <p:sp>
+        <p:nvSpPr>
+          <p:cNvPr id="23" name="CaixaDeTexto 22"/>
+          <p:cNvSpPr txBox="1"/>
+          <p:nvPr/>
+        </p:nvSpPr>
+        <p:spPr>
+          <a:xfrm>
+            <a:off x="4944959" y="2719128"/>
+            <a:ext cx="1026837" cy="276999"/>
+          </a:xfrm>
+          <a:prstGeom prst="rect">
+            <a:avLst/>
+          </a:prstGeom>
+          <a:solidFill>
+            <a:schemeClr val="bg1"/>
+          </a:solidFill>
+        </p:spPr>
+        <p:txBody>
+          <a:bodyPr wrap="square" rtlCol="0">
+            <a:spAutoFit/>
+          </a:bodyPr>
+          <a:lstStyle/>
+          <a:p>
+            <a:pPr algn="ctr"/>
+            <a:r>
+              <a:rPr lang="pt-BR" sz="1200" dirty="0" smtClean="0">
+                <a:latin typeface="Arial" panose="020B0604020202020204" pitchFamily="34" charset="0"/>
+                <a:cs typeface="Arial" panose="020B0604020202020204" pitchFamily="34" charset="0"/>
+              </a:rPr>
+              <a:t>Produto</a:t>
+            </a:r>
+          </a:p>
+        </p:txBody>
+      </p:sp>
+      <p:cxnSp>
+        <p:nvCxnSpPr>
+          <p:cNvPr id="24" name="Conector em curva 23"/>
+          <p:cNvCxnSpPr/>
+          <p:nvPr/>
+        </p:nvCxnSpPr>
+        <p:spPr>
+          <a:xfrm rot="10800000">
+            <a:off x="4083026" y="2081732"/>
+            <a:ext cx="112432" cy="1506509"/>
+          </a:xfrm>
+          <a:prstGeom prst="curvedConnector3">
+            <a:avLst>
+              <a:gd name="adj1" fmla="val 716635"/>
+            </a:avLst>
+          </a:prstGeom>
+          <a:ln>
+            <a:solidFill>
+              <a:schemeClr val="tx1"/>
+            </a:solidFill>
+            <a:tailEnd type="triangle"/>
+          </a:ln>
+        </p:spPr>
+        <p:style>
+          <a:lnRef idx="1">
+            <a:schemeClr val="accent1"/>
+          </a:lnRef>
+          <a:fillRef idx="0">
+            <a:schemeClr val="accent1"/>
+          </a:fillRef>
+          <a:effectRef idx="0">
+            <a:schemeClr val="accent1"/>
+          </a:effectRef>
+          <a:fontRef idx="minor">
+            <a:schemeClr val="tx1"/>
+          </a:fontRef>
+        </p:style>
+      </p:cxnSp>
+      <p:sp>
+        <p:nvSpPr>
+          <p:cNvPr id="25" name="CaixaDeTexto 24"/>
+          <p:cNvSpPr txBox="1"/>
+          <p:nvPr/>
+        </p:nvSpPr>
+        <p:spPr>
+          <a:xfrm>
+            <a:off x="2797617" y="2500576"/>
+            <a:ext cx="1457795" cy="461665"/>
+          </a:xfrm>
+          <a:prstGeom prst="rect">
+            <a:avLst/>
+          </a:prstGeom>
+          <a:solidFill>
+            <a:schemeClr val="bg1"/>
+          </a:solidFill>
+        </p:spPr>
+        <p:txBody>
+          <a:bodyPr wrap="square" rtlCol="0">
+            <a:spAutoFit/>
+          </a:bodyPr>
+          <a:lstStyle/>
+          <a:p>
+            <a:r>
+              <a:rPr lang="pt-BR" sz="1200" dirty="0" smtClean="0">
+                <a:latin typeface="Arial" panose="020B0604020202020204" pitchFamily="34" charset="0"/>
+                <a:cs typeface="Arial" panose="020B0604020202020204" pitchFamily="34" charset="0"/>
+              </a:rPr>
+              <a:t>Data de retirada do produto</a:t>
+            </a:r>
+          </a:p>
+        </p:txBody>
+      </p:sp>
+      <p:cxnSp>
+        <p:nvCxnSpPr>
+          <p:cNvPr id="26" name="Conector reto 25"/>
+          <p:cNvCxnSpPr/>
+          <p:nvPr/>
+        </p:nvCxnSpPr>
+        <p:spPr>
+          <a:xfrm>
+            <a:off x="2709244" y="4470161"/>
+            <a:ext cx="1049303" cy="0"/>
+          </a:xfrm>
+          <a:prstGeom prst="line">
+            <a:avLst/>
+          </a:prstGeom>
+          <a:ln>
+            <a:solidFill>
+              <a:schemeClr val="tx1"/>
+            </a:solidFill>
+          </a:ln>
+        </p:spPr>
+        <p:style>
+          <a:lnRef idx="1">
+            <a:schemeClr val="accent1"/>
+          </a:lnRef>
+          <a:fillRef idx="0">
+            <a:schemeClr val="accent1"/>
+          </a:fillRef>
+          <a:effectRef idx="0">
+            <a:schemeClr val="accent1"/>
+          </a:effectRef>
+          <a:fontRef idx="minor">
+            <a:schemeClr val="tx1"/>
+          </a:fontRef>
+        </p:style>
+      </p:cxnSp>
+      <p:cxnSp>
+        <p:nvCxnSpPr>
+          <p:cNvPr id="27" name="Conector reto 26"/>
+          <p:cNvCxnSpPr/>
+          <p:nvPr/>
+        </p:nvCxnSpPr>
+        <p:spPr>
+          <a:xfrm>
+            <a:off x="2696754" y="4877391"/>
+            <a:ext cx="1049303" cy="0"/>
+          </a:xfrm>
+          <a:prstGeom prst="line">
+            <a:avLst/>
+          </a:prstGeom>
+          <a:ln>
+            <a:solidFill>
+              <a:schemeClr val="tx1"/>
+            </a:solidFill>
+          </a:ln>
+        </p:spPr>
+        <p:style>
+          <a:lnRef idx="1">
+            <a:schemeClr val="accent1"/>
+          </a:lnRef>
+          <a:fillRef idx="0">
+            <a:schemeClr val="accent1"/>
+          </a:fillRef>
+          <a:effectRef idx="0">
+            <a:schemeClr val="accent1"/>
+          </a:effectRef>
+          <a:fontRef idx="minor">
+            <a:schemeClr val="tx1"/>
+          </a:fontRef>
+        </p:style>
+      </p:cxnSp>
+      <p:sp>
+        <p:nvSpPr>
+          <p:cNvPr id="28" name="CaixaDeTexto 27"/>
+          <p:cNvSpPr txBox="1"/>
+          <p:nvPr/>
+        </p:nvSpPr>
+        <p:spPr>
+          <a:xfrm>
+            <a:off x="2719231" y="4525439"/>
+            <a:ext cx="1109277" cy="276999"/>
+          </a:xfrm>
+          <a:prstGeom prst="rect">
+            <a:avLst/>
+          </a:prstGeom>
+          <a:solidFill>
+            <a:schemeClr val="bg1"/>
+          </a:solidFill>
+        </p:spPr>
+        <p:txBody>
+          <a:bodyPr wrap="square" rtlCol="0">
+            <a:spAutoFit/>
+          </a:bodyPr>
+          <a:lstStyle/>
+          <a:p>
+            <a:r>
+              <a:rPr lang="pt-BR" sz="1200" dirty="0" smtClean="0">
+                <a:latin typeface="Arial" panose="020B0604020202020204" pitchFamily="34" charset="0"/>
+                <a:cs typeface="Arial" panose="020B0604020202020204" pitchFamily="34" charset="0"/>
+              </a:rPr>
+              <a:t>Encomenda</a:t>
+            </a:r>
+          </a:p>
+        </p:txBody>
+      </p:sp>
+      <p:cxnSp>
+        <p:nvCxnSpPr>
+          <p:cNvPr id="30" name="Conector de seta reta 29"/>
+          <p:cNvCxnSpPr>
+            <a:stCxn id="7" idx="3"/>
+          </p:cNvCxnSpPr>
+          <p:nvPr/>
+        </p:nvCxnSpPr>
+        <p:spPr>
+          <a:xfrm flipH="1">
+            <a:off x="3531053" y="3816132"/>
+            <a:ext cx="767582" cy="649031"/>
+          </a:xfrm>
+          <a:prstGeom prst="straightConnector1">
+            <a:avLst/>
+          </a:prstGeom>
+          <a:ln>
+            <a:solidFill>
+              <a:schemeClr val="tx1"/>
+            </a:solidFill>
+            <a:headEnd type="triangle"/>
+            <a:tailEnd type="triangle"/>
+          </a:ln>
+        </p:spPr>
+        <p:style>
+          <a:lnRef idx="1">
+            <a:schemeClr val="accent1"/>
+          </a:lnRef>
+          <a:fillRef idx="0">
+            <a:schemeClr val="accent1"/>
+          </a:fillRef>
+          <a:effectRef idx="0">
+            <a:schemeClr val="accent1"/>
+          </a:effectRef>
+          <a:fontRef idx="minor">
+            <a:schemeClr val="tx1"/>
+          </a:fontRef>
+        </p:style>
+      </p:cxnSp>
+      <p:sp>
+        <p:nvSpPr>
+          <p:cNvPr id="32" name="CaixaDeTexto 31"/>
+          <p:cNvSpPr txBox="1"/>
+          <p:nvPr/>
+        </p:nvSpPr>
+        <p:spPr>
+          <a:xfrm>
+            <a:off x="6341019" y="2571104"/>
+            <a:ext cx="1339122" cy="461665"/>
+          </a:xfrm>
+          <a:prstGeom prst="rect">
+            <a:avLst/>
+          </a:prstGeom>
+          <a:solidFill>
+            <a:schemeClr val="bg1"/>
+          </a:solidFill>
+        </p:spPr>
+        <p:txBody>
+          <a:bodyPr wrap="square" rtlCol="0">
+            <a:spAutoFit/>
+          </a:bodyPr>
+          <a:lstStyle/>
+          <a:p>
+            <a:r>
+              <a:rPr lang="pt-BR" sz="1200" dirty="0" smtClean="0">
+                <a:latin typeface="Arial" panose="020B0604020202020204" pitchFamily="34" charset="0"/>
+                <a:cs typeface="Arial" panose="020B0604020202020204" pitchFamily="34" charset="0"/>
+              </a:rPr>
+              <a:t>Troca por outro produto</a:t>
+            </a:r>
+          </a:p>
+        </p:txBody>
+      </p:sp>
+      <p:sp>
+        <p:nvSpPr>
+          <p:cNvPr id="33" name="Elipse 32"/>
+          <p:cNvSpPr/>
+          <p:nvPr/>
+        </p:nvSpPr>
+        <p:spPr>
+          <a:xfrm>
+            <a:off x="6607257" y="3283440"/>
+            <a:ext cx="704538" cy="644577"/>
+          </a:xfrm>
+          <a:prstGeom prst="ellipse">
+            <a:avLst/>
+          </a:prstGeom>
+          <a:noFill/>
+          <a:ln>
+            <a:solidFill>
+              <a:schemeClr val="tx1"/>
+            </a:solidFill>
+          </a:ln>
+        </p:spPr>
+        <p:style>
+          <a:lnRef idx="2">
+            <a:schemeClr val="accent1">
+              <a:shade val="50000"/>
+            </a:schemeClr>
+          </a:lnRef>
+          <a:fillRef idx="1">
+            <a:schemeClr val="accent1"/>
+          </a:fillRef>
+          <a:effectRef idx="0">
+            <a:schemeClr val="accent1"/>
+          </a:effectRef>
+          <a:fontRef idx="minor">
+            <a:schemeClr val="lt1"/>
+          </a:fontRef>
+        </p:style>
+        <p:txBody>
+          <a:bodyPr rtlCol="0" anchor="ctr"/>
+          <a:lstStyle/>
+          <a:p>
+            <a:pPr algn="ctr"/>
+            <a:endParaRPr lang="pt-BR"/>
+          </a:p>
+        </p:txBody>
+      </p:sp>
+      <p:sp>
+        <p:nvSpPr>
+          <p:cNvPr id="35" name="Retângulo 34"/>
+          <p:cNvSpPr/>
+          <p:nvPr/>
+        </p:nvSpPr>
+        <p:spPr>
+          <a:xfrm>
+            <a:off x="6437679" y="1781927"/>
+            <a:ext cx="929390" cy="599607"/>
+          </a:xfrm>
+          <a:prstGeom prst="rect">
+            <a:avLst/>
+          </a:prstGeom>
+          <a:noFill/>
+          <a:ln>
+            <a:solidFill>
+              <a:schemeClr val="tx1"/>
+            </a:solidFill>
+          </a:ln>
+        </p:spPr>
+        <p:style>
+          <a:lnRef idx="2">
+            <a:schemeClr val="accent1">
+              <a:shade val="50000"/>
+            </a:schemeClr>
+          </a:lnRef>
+          <a:fillRef idx="1">
+            <a:schemeClr val="accent1"/>
+          </a:fillRef>
+          <a:effectRef idx="0">
+            <a:schemeClr val="accent1"/>
+          </a:effectRef>
+          <a:fontRef idx="minor">
+            <a:schemeClr val="lt1"/>
+          </a:fontRef>
+        </p:style>
+        <p:txBody>
+          <a:bodyPr rtlCol="0" anchor="ctr"/>
+          <a:lstStyle/>
+          <a:p>
+            <a:pPr algn="ctr"/>
+            <a:endParaRPr lang="pt-BR"/>
+          </a:p>
+        </p:txBody>
+      </p:sp>
+      <p:sp>
+        <p:nvSpPr>
+          <p:cNvPr id="36" name="CaixaDeTexto 35"/>
+          <p:cNvSpPr txBox="1"/>
+          <p:nvPr/>
+        </p:nvSpPr>
+        <p:spPr>
+          <a:xfrm>
+            <a:off x="6582585" y="1927154"/>
+            <a:ext cx="689548" cy="276999"/>
+          </a:xfrm>
+          <a:prstGeom prst="rect">
+            <a:avLst/>
+          </a:prstGeom>
+          <a:solidFill>
+            <a:schemeClr val="bg1"/>
+          </a:solidFill>
+        </p:spPr>
+        <p:txBody>
+          <a:bodyPr wrap="square" rtlCol="0">
+            <a:spAutoFit/>
+          </a:bodyPr>
+          <a:lstStyle/>
+          <a:p>
+            <a:r>
+              <a:rPr lang="pt-BR" sz="1200" dirty="0" smtClean="0">
+                <a:latin typeface="Arial" panose="020B0604020202020204" pitchFamily="34" charset="0"/>
+                <a:cs typeface="Arial" panose="020B0604020202020204" pitchFamily="34" charset="0"/>
+              </a:rPr>
+              <a:t>Cliente</a:t>
+            </a:r>
+          </a:p>
+        </p:txBody>
+      </p:sp>
+      <p:cxnSp>
+        <p:nvCxnSpPr>
+          <p:cNvPr id="37" name="Conector de seta reta 36"/>
+          <p:cNvCxnSpPr/>
+          <p:nvPr/>
+        </p:nvCxnSpPr>
+        <p:spPr>
+          <a:xfrm>
+            <a:off x="6935321" y="2400584"/>
+            <a:ext cx="6" cy="884417"/>
+          </a:xfrm>
+          <a:prstGeom prst="straightConnector1">
+            <a:avLst/>
+          </a:prstGeom>
+          <a:ln>
+            <a:solidFill>
+              <a:schemeClr val="tx1"/>
+            </a:solidFill>
+            <a:tailEnd type="triangle"/>
+          </a:ln>
+        </p:spPr>
+        <p:style>
+          <a:lnRef idx="1">
+            <a:schemeClr val="accent1"/>
+          </a:lnRef>
+          <a:fillRef idx="0">
+            <a:schemeClr val="accent1"/>
+          </a:fillRef>
+          <a:effectRef idx="0">
+            <a:schemeClr val="accent1"/>
+          </a:effectRef>
+          <a:fontRef idx="minor">
+            <a:schemeClr val="tx1"/>
+          </a:fontRef>
+        </p:style>
+      </p:cxnSp>
+      <p:cxnSp>
+        <p:nvCxnSpPr>
+          <p:cNvPr id="39" name="Conector de seta reta 38"/>
+          <p:cNvCxnSpPr>
+            <a:endCxn id="33" idx="3"/>
+          </p:cNvCxnSpPr>
+          <p:nvPr/>
+        </p:nvCxnSpPr>
+        <p:spPr>
+          <a:xfrm flipV="1">
+            <a:off x="4974109" y="3833621"/>
+            <a:ext cx="1736325" cy="631542"/>
+          </a:xfrm>
+          <a:prstGeom prst="straightConnector1">
+            <a:avLst/>
+          </a:prstGeom>
+          <a:ln>
+            <a:solidFill>
+              <a:schemeClr val="tx1"/>
+            </a:solidFill>
+            <a:tailEnd type="triangle"/>
+          </a:ln>
+        </p:spPr>
+        <p:style>
+          <a:lnRef idx="1">
+            <a:schemeClr val="accent1"/>
+          </a:lnRef>
+          <a:fillRef idx="0">
+            <a:schemeClr val="accent1"/>
+          </a:fillRef>
+          <a:effectRef idx="0">
+            <a:schemeClr val="accent1"/>
+          </a:effectRef>
+          <a:fontRef idx="minor">
+            <a:schemeClr val="tx1"/>
+          </a:fontRef>
+        </p:style>
+      </p:cxnSp>
+      <p:cxnSp>
+        <p:nvCxnSpPr>
+          <p:cNvPr id="41" name="Conector de seta reta 40"/>
+          <p:cNvCxnSpPr/>
+          <p:nvPr/>
+        </p:nvCxnSpPr>
+        <p:spPr>
+          <a:xfrm flipH="1">
+            <a:off x="6125028" y="3942447"/>
+            <a:ext cx="542583" cy="522716"/>
+          </a:xfrm>
+          <a:prstGeom prst="straightConnector1">
+            <a:avLst/>
+          </a:prstGeom>
+          <a:ln>
+            <a:solidFill>
+              <a:schemeClr val="tx1"/>
+            </a:solidFill>
+            <a:headEnd type="triangle"/>
+            <a:tailEnd type="triangle"/>
+          </a:ln>
+        </p:spPr>
+        <p:style>
+          <a:lnRef idx="1">
+            <a:schemeClr val="accent1"/>
+          </a:lnRef>
+          <a:fillRef idx="0">
+            <a:schemeClr val="accent1"/>
+          </a:fillRef>
+          <a:effectRef idx="0">
+            <a:schemeClr val="accent1"/>
+          </a:effectRef>
+          <a:fontRef idx="minor">
+            <a:schemeClr val="tx1"/>
+          </a:fontRef>
+        </p:style>
+      </p:cxnSp>
+      <p:cxnSp>
+        <p:nvCxnSpPr>
+          <p:cNvPr id="46" name="Conector em curva 45"/>
+          <p:cNvCxnSpPr/>
+          <p:nvPr/>
+        </p:nvCxnSpPr>
+        <p:spPr>
+          <a:xfrm flipV="1">
+            <a:off x="7311795" y="2039937"/>
+            <a:ext cx="55274" cy="1523998"/>
+          </a:xfrm>
+          <a:prstGeom prst="curvedConnector3">
+            <a:avLst>
+              <a:gd name="adj1" fmla="val 1685375"/>
+            </a:avLst>
+          </a:prstGeom>
+          <a:ln>
+            <a:solidFill>
+              <a:schemeClr val="tx1"/>
+            </a:solidFill>
+            <a:tailEnd type="triangle"/>
+          </a:ln>
+        </p:spPr>
+        <p:style>
+          <a:lnRef idx="1">
+            <a:schemeClr val="accent1"/>
+          </a:lnRef>
+          <a:fillRef idx="0">
+            <a:schemeClr val="accent1"/>
+          </a:fillRef>
+          <a:effectRef idx="0">
+            <a:schemeClr val="accent1"/>
+          </a:effectRef>
+          <a:fontRef idx="minor">
+            <a:schemeClr val="tx1"/>
+          </a:fontRef>
+        </p:style>
+      </p:cxnSp>
+      <p:sp>
+        <p:nvSpPr>
+          <p:cNvPr id="52" name="CaixaDeTexto 51"/>
+          <p:cNvSpPr txBox="1"/>
+          <p:nvPr/>
+        </p:nvSpPr>
+        <p:spPr>
+          <a:xfrm>
+            <a:off x="7764359" y="2744528"/>
+            <a:ext cx="1026837" cy="276999"/>
+          </a:xfrm>
+          <a:prstGeom prst="rect">
+            <a:avLst/>
+          </a:prstGeom>
+          <a:solidFill>
+            <a:schemeClr val="bg1"/>
+          </a:solidFill>
+        </p:spPr>
+        <p:txBody>
+          <a:bodyPr wrap="square" rtlCol="0">
+            <a:spAutoFit/>
+          </a:bodyPr>
+          <a:lstStyle/>
+          <a:p>
+            <a:pPr algn="ctr"/>
+            <a:r>
+              <a:rPr lang="pt-BR" sz="1200" dirty="0" smtClean="0">
+                <a:latin typeface="Arial" panose="020B0604020202020204" pitchFamily="34" charset="0"/>
+                <a:cs typeface="Arial" panose="020B0604020202020204" pitchFamily="34" charset="0"/>
+              </a:rPr>
+              <a:t>Produto</a:t>
+            </a:r>
+          </a:p>
+        </p:txBody>
+      </p:sp>
+      <p:cxnSp>
+        <p:nvCxnSpPr>
+          <p:cNvPr id="54" name="Conector em curva 53"/>
+          <p:cNvCxnSpPr>
+            <a:stCxn id="33" idx="2"/>
+            <a:endCxn id="35" idx="1"/>
+          </p:cNvCxnSpPr>
+          <p:nvPr/>
+        </p:nvCxnSpPr>
+        <p:spPr>
+          <a:xfrm rot="10800000">
+            <a:off x="6437679" y="2081731"/>
+            <a:ext cx="169578" cy="1523998"/>
+          </a:xfrm>
+          <a:prstGeom prst="curvedConnector3">
+            <a:avLst>
+              <a:gd name="adj1" fmla="val 309697"/>
+            </a:avLst>
+          </a:prstGeom>
+          <a:ln>
+            <a:solidFill>
+              <a:schemeClr val="tx1"/>
+            </a:solidFill>
+            <a:tailEnd type="triangle"/>
+          </a:ln>
+        </p:spPr>
+        <p:style>
+          <a:lnRef idx="1">
+            <a:schemeClr val="accent1"/>
+          </a:lnRef>
+          <a:fillRef idx="0">
+            <a:schemeClr val="accent1"/>
+          </a:fillRef>
+          <a:effectRef idx="0">
+            <a:schemeClr val="accent1"/>
+          </a:effectRef>
+          <a:fontRef idx="minor">
+            <a:schemeClr val="tx1"/>
+          </a:fontRef>
+        </p:style>
+      </p:cxnSp>
+      <p:sp>
+        <p:nvSpPr>
+          <p:cNvPr id="56" name="CaixaDeTexto 55"/>
+          <p:cNvSpPr txBox="1"/>
+          <p:nvPr/>
+        </p:nvSpPr>
+        <p:spPr>
+          <a:xfrm>
+            <a:off x="5486994" y="3006962"/>
+            <a:ext cx="1026837" cy="900246"/>
+          </a:xfrm>
+          <a:prstGeom prst="rect">
+            <a:avLst/>
+          </a:prstGeom>
+          <a:solidFill>
+            <a:schemeClr val="bg1"/>
+          </a:solidFill>
+        </p:spPr>
+        <p:txBody>
+          <a:bodyPr wrap="square" rtlCol="0">
+            <a:spAutoFit/>
+          </a:bodyPr>
+          <a:lstStyle/>
+          <a:p>
+            <a:pPr algn="ctr"/>
+            <a:r>
+              <a:rPr lang="pt-BR" sz="1050" dirty="0" smtClean="0">
+                <a:latin typeface="Arial" panose="020B0604020202020204" pitchFamily="34" charset="0"/>
+                <a:cs typeface="Arial" panose="020B0604020202020204" pitchFamily="34" charset="0"/>
+              </a:rPr>
+              <a:t>Produto</a:t>
+            </a:r>
+          </a:p>
+          <a:p>
+            <a:pPr algn="ctr"/>
+            <a:r>
+              <a:rPr lang="pt-BR" sz="1050" dirty="0" smtClean="0">
+                <a:latin typeface="Arial" panose="020B0604020202020204" pitchFamily="34" charset="0"/>
+                <a:cs typeface="Arial" panose="020B0604020202020204" pitchFamily="34" charset="0"/>
+              </a:rPr>
+              <a:t>Indisponível+ </a:t>
+            </a:r>
+            <a:r>
+              <a:rPr lang="pt-BR" sz="1050" dirty="0" smtClean="0">
+                <a:latin typeface="Arial" panose="020B0604020202020204" pitchFamily="34" charset="0"/>
+                <a:cs typeface="Arial" panose="020B0604020202020204" pitchFamily="34" charset="0"/>
+              </a:rPr>
+              <a:t>pagamento</a:t>
+            </a:r>
+          </a:p>
+          <a:p>
+            <a:pPr algn="ctr"/>
+            <a:r>
+              <a:rPr lang="pt-BR" sz="1050" dirty="0" smtClean="0">
+                <a:latin typeface="Arial" panose="020B0604020202020204" pitchFamily="34" charset="0"/>
+                <a:cs typeface="Arial" panose="020B0604020202020204" pitchFamily="34" charset="0"/>
+              </a:rPr>
+              <a:t>+</a:t>
+            </a:r>
+          </a:p>
+          <a:p>
+            <a:pPr algn="ctr"/>
+            <a:r>
+              <a:rPr lang="pt-BR" sz="1050" dirty="0" smtClean="0">
+                <a:latin typeface="Arial" panose="020B0604020202020204" pitchFamily="34" charset="0"/>
+                <a:cs typeface="Arial" panose="020B0604020202020204" pitchFamily="34" charset="0"/>
+              </a:rPr>
+              <a:t>(estorno)</a:t>
+            </a:r>
+            <a:endParaRPr lang="pt-BR" sz="1050" dirty="0" smtClean="0">
+              <a:latin typeface="Arial" panose="020B0604020202020204" pitchFamily="34" charset="0"/>
+              <a:cs typeface="Arial" panose="020B0604020202020204" pitchFamily="34" charset="0"/>
+            </a:endParaRPr>
+          </a:p>
+        </p:txBody>
+      </p:sp>
+      <p:sp>
+        <p:nvSpPr>
+          <p:cNvPr id="38" name="CaixaDeTexto 37"/>
+          <p:cNvSpPr txBox="1"/>
+          <p:nvPr/>
+        </p:nvSpPr>
+        <p:spPr>
+          <a:xfrm>
+            <a:off x="4254007" y="3401955"/>
+            <a:ext cx="689548" cy="400110"/>
+          </a:xfrm>
+          <a:prstGeom prst="rect">
+            <a:avLst/>
+          </a:prstGeom>
+          <a:noFill/>
+        </p:spPr>
+        <p:txBody>
+          <a:bodyPr wrap="square" rtlCol="0">
+            <a:spAutoFit/>
+          </a:bodyPr>
+          <a:lstStyle/>
+          <a:p>
+            <a:r>
+              <a:rPr lang="pt-BR" sz="1000" dirty="0" smtClean="0">
+                <a:latin typeface="Arial" panose="020B0604020202020204" pitchFamily="34" charset="0"/>
+                <a:cs typeface="Arial" panose="020B0604020202020204" pitchFamily="34" charset="0"/>
+              </a:rPr>
+              <a:t>Tratar Troca</a:t>
+            </a:r>
+          </a:p>
+        </p:txBody>
+      </p:sp>
+      <p:sp>
+        <p:nvSpPr>
+          <p:cNvPr id="40" name="CaixaDeTexto 39"/>
+          <p:cNvSpPr txBox="1"/>
+          <p:nvPr/>
+        </p:nvSpPr>
+        <p:spPr>
+          <a:xfrm>
+            <a:off x="6609569" y="3333589"/>
+            <a:ext cx="795652" cy="553998"/>
+          </a:xfrm>
+          <a:prstGeom prst="rect">
+            <a:avLst/>
+          </a:prstGeom>
+          <a:noFill/>
+        </p:spPr>
+        <p:txBody>
+          <a:bodyPr wrap="square" rtlCol="0">
+            <a:spAutoFit/>
+          </a:bodyPr>
+          <a:lstStyle/>
+          <a:p>
+            <a:r>
+              <a:rPr lang="pt-BR" sz="1000" dirty="0" smtClean="0">
+                <a:latin typeface="Arial" panose="020B0604020202020204" pitchFamily="34" charset="0"/>
+                <a:cs typeface="Arial" panose="020B0604020202020204" pitchFamily="34" charset="0"/>
+              </a:rPr>
+              <a:t>Trocar por outro produto</a:t>
+            </a:r>
+            <a:endParaRPr lang="pt-BR" sz="1000" dirty="0">
+              <a:latin typeface="Arial" panose="020B0604020202020204" pitchFamily="34" charset="0"/>
+              <a:cs typeface="Arial" panose="020B0604020202020204" pitchFamily="34" charset="0"/>
+            </a:endParaRPr>
+          </a:p>
+        </p:txBody>
+      </p:sp>
+    </p:spTree>
+    <p:extLst>
+      <p:ext uri="{BB962C8B-B14F-4D97-AF65-F5344CB8AC3E}">
+        <p14:creationId xmlns:p14="http://schemas.microsoft.com/office/powerpoint/2010/main" val="968244827"/>
       </p:ext>
     </p:extLst>
   </p:cSld>

</xml_diff>